<commit_message>
course: module 01 & 02 & 03 ios
</commit_message>
<xml_diff>
--- a/course/IOS_Module_02_ui_design.pptx
+++ b/course/IOS_Module_02_ui_design.pptx
@@ -263,7 +263,7 @@
           <a:p>
             <a:fld id="{B0D817E9-BC83-4300-AD8F-F2CC118C1A29}" type="datetimeFigureOut">
               <a:rPr lang="en-US" smtClean="0"/>
-              <a:t>4/9/2015</a:t>
+              <a:t>4/13/2015</a:t>
             </a:fld>
             <a:endParaRPr lang="en-US"/>
           </a:p>
@@ -2879,7 +2879,7 @@
           <a:p>
             <a:pPr defTabSz="756025"/>
             <a:r>
-              <a:rPr lang="en-US" dirty="0">
+              <a:rPr lang="en-US" b="1" dirty="0">
                 <a:ln w="0"/>
                 <a:solidFill>
                   <a:schemeClr val="accent5">
@@ -2905,8 +2905,8 @@
         </p:nvSpPr>
         <p:spPr>
           <a:xfrm>
-            <a:off x="4171983" y="2513595"/>
-            <a:ext cx="5832751" cy="707886"/>
+            <a:off x="4178395" y="2513595"/>
+            <a:ext cx="5819927" cy="707886"/>
           </a:xfrm>
           <a:prstGeom prst="rect">
             <a:avLst/>
@@ -2921,7 +2921,7 @@
           <a:p>
             <a:pPr algn="ctr"/>
             <a:r>
-              <a:rPr lang="en-US" sz="4000" cap="none" spc="0" dirty="0">
+              <a:rPr lang="en-US" sz="4000" b="1" dirty="0" err="1">
                 <a:ln w="0"/>
                 <a:solidFill>
                   <a:schemeClr val="accent5">
@@ -2933,9 +2933,54 @@
                 </a:effectLst>
                 <a:latin typeface="Corbel" panose="020B0503020204020204" pitchFamily="34" charset="0"/>
               </a:rPr>
-              <a:t>IOS Mobile Development </a:t>
-            </a:r>
-            <a:endParaRPr lang="en-US" sz="4000" cap="none" spc="0" dirty="0">
+              <a:t>i</a:t>
+            </a:r>
+            <a:r>
+              <a:rPr lang="en-US" sz="4000" b="1" cap="none" spc="0" dirty="0" err="1" smtClean="0">
+                <a:ln w="0"/>
+                <a:solidFill>
+                  <a:schemeClr val="accent5">
+                    <a:lumMod val="75000"/>
+                  </a:schemeClr>
+                </a:solidFill>
+                <a:effectLst>
+                  <a:reflection blurRad="6350" stA="53000" endA="300" endPos="35500" dir="5400000" sy="-90000" algn="bl" rotWithShape="0"/>
+                </a:effectLst>
+                <a:latin typeface="Corbel" panose="020B0503020204020204" pitchFamily="34" charset="0"/>
+              </a:rPr>
+              <a:t>OS</a:t>
+            </a:r>
+            <a:r>
+              <a:rPr lang="en-US" sz="4000" b="1" cap="none" spc="0" dirty="0" smtClean="0">
+                <a:ln w="0"/>
+                <a:solidFill>
+                  <a:schemeClr val="accent5">
+                    <a:lumMod val="75000"/>
+                  </a:schemeClr>
+                </a:solidFill>
+                <a:effectLst>
+                  <a:reflection blurRad="6350" stA="53000" endA="300" endPos="35500" dir="5400000" sy="-90000" algn="bl" rotWithShape="0"/>
+                </a:effectLst>
+                <a:latin typeface="Corbel" panose="020B0503020204020204" pitchFamily="34" charset="0"/>
+              </a:rPr>
+              <a:t> </a:t>
+            </a:r>
+            <a:r>
+              <a:rPr lang="en-US" sz="4000" b="1" cap="none" spc="0" dirty="0">
+                <a:ln w="0"/>
+                <a:solidFill>
+                  <a:schemeClr val="accent5">
+                    <a:lumMod val="75000"/>
+                  </a:schemeClr>
+                </a:solidFill>
+                <a:effectLst>
+                  <a:reflection blurRad="6350" stA="53000" endA="300" endPos="35500" dir="5400000" sy="-90000" algn="bl" rotWithShape="0"/>
+                </a:effectLst>
+                <a:latin typeface="Corbel" panose="020B0503020204020204" pitchFamily="34" charset="0"/>
+              </a:rPr>
+              <a:t>Mobile Development </a:t>
+            </a:r>
+            <a:endParaRPr lang="en-US" sz="4000" b="1" cap="none" spc="0" dirty="0">
               <a:ln w="0"/>
               <a:solidFill>
                 <a:schemeClr val="accent5">
@@ -13291,17 +13336,7 @@
                   </a:schemeClr>
                 </a:solidFill>
               </a:rPr>
-              <a:t>When </a:t>
-            </a:r>
-            <a:r>
-              <a:rPr lang="en-US" dirty="0" smtClean="0">
-                <a:solidFill>
-                  <a:schemeClr val="accent5">
-                    <a:lumMod val="75000"/>
-                  </a:schemeClr>
-                </a:solidFill>
-              </a:rPr>
-              <a:t>should we use story board?</a:t>
+              <a:t>When should we use story board?</a:t>
             </a:r>
             <a:endParaRPr lang="en-US" dirty="0">
               <a:solidFill>

</xml_diff>